<commit_message>
manip figure with sigma
</commit_message>
<xml_diff>
--- a/Pubs/CDC16/Paper/figs/ManipArm.pptx
+++ b/Pubs/CDC16/Paper/figs/ManipArm.pptx
@@ -288,7 +288,7 @@
           <a:p>
             <a:fld id="{BE030ECD-E892-4916-8E25-18546EF25E3A}" type="datetimeFigureOut">
               <a:rPr lang="en-US" smtClean="0"/>
-              <a:t>3/13/2016</a:t>
+              <a:t>3/16/2016</a:t>
             </a:fld>
             <a:endParaRPr lang="en-US"/>
           </a:p>
@@ -458,7 +458,7 @@
           <a:p>
             <a:fld id="{BE030ECD-E892-4916-8E25-18546EF25E3A}" type="datetimeFigureOut">
               <a:rPr lang="en-US" smtClean="0"/>
-              <a:t>3/13/2016</a:t>
+              <a:t>3/16/2016</a:t>
             </a:fld>
             <a:endParaRPr lang="en-US"/>
           </a:p>
@@ -638,7 +638,7 @@
           <a:p>
             <a:fld id="{BE030ECD-E892-4916-8E25-18546EF25E3A}" type="datetimeFigureOut">
               <a:rPr lang="en-US" smtClean="0"/>
-              <a:t>3/13/2016</a:t>
+              <a:t>3/16/2016</a:t>
             </a:fld>
             <a:endParaRPr lang="en-US"/>
           </a:p>
@@ -808,7 +808,7 @@
           <a:p>
             <a:fld id="{BE030ECD-E892-4916-8E25-18546EF25E3A}" type="datetimeFigureOut">
               <a:rPr lang="en-US" smtClean="0"/>
-              <a:t>3/13/2016</a:t>
+              <a:t>3/16/2016</a:t>
             </a:fld>
             <a:endParaRPr lang="en-US"/>
           </a:p>
@@ -1054,7 +1054,7 @@
           <a:p>
             <a:fld id="{BE030ECD-E892-4916-8E25-18546EF25E3A}" type="datetimeFigureOut">
               <a:rPr lang="en-US" smtClean="0"/>
-              <a:t>3/13/2016</a:t>
+              <a:t>3/16/2016</a:t>
             </a:fld>
             <a:endParaRPr lang="en-US"/>
           </a:p>
@@ -1342,7 +1342,7 @@
           <a:p>
             <a:fld id="{BE030ECD-E892-4916-8E25-18546EF25E3A}" type="datetimeFigureOut">
               <a:rPr lang="en-US" smtClean="0"/>
-              <a:t>3/13/2016</a:t>
+              <a:t>3/16/2016</a:t>
             </a:fld>
             <a:endParaRPr lang="en-US"/>
           </a:p>
@@ -1764,7 +1764,7 @@
           <a:p>
             <a:fld id="{BE030ECD-E892-4916-8E25-18546EF25E3A}" type="datetimeFigureOut">
               <a:rPr lang="en-US" smtClean="0"/>
-              <a:t>3/13/2016</a:t>
+              <a:t>3/16/2016</a:t>
             </a:fld>
             <a:endParaRPr lang="en-US"/>
           </a:p>
@@ -1882,7 +1882,7 @@
           <a:p>
             <a:fld id="{BE030ECD-E892-4916-8E25-18546EF25E3A}" type="datetimeFigureOut">
               <a:rPr lang="en-US" smtClean="0"/>
-              <a:t>3/13/2016</a:t>
+              <a:t>3/16/2016</a:t>
             </a:fld>
             <a:endParaRPr lang="en-US"/>
           </a:p>
@@ -1977,7 +1977,7 @@
           <a:p>
             <a:fld id="{BE030ECD-E892-4916-8E25-18546EF25E3A}" type="datetimeFigureOut">
               <a:rPr lang="en-US" smtClean="0"/>
-              <a:t>3/13/2016</a:t>
+              <a:t>3/16/2016</a:t>
             </a:fld>
             <a:endParaRPr lang="en-US"/>
           </a:p>
@@ -2254,7 +2254,7 @@
           <a:p>
             <a:fld id="{BE030ECD-E892-4916-8E25-18546EF25E3A}" type="datetimeFigureOut">
               <a:rPr lang="en-US" smtClean="0"/>
-              <a:t>3/13/2016</a:t>
+              <a:t>3/16/2016</a:t>
             </a:fld>
             <a:endParaRPr lang="en-US"/>
           </a:p>
@@ -2507,7 +2507,7 @@
           <a:p>
             <a:fld id="{BE030ECD-E892-4916-8E25-18546EF25E3A}" type="datetimeFigureOut">
               <a:rPr lang="en-US" smtClean="0"/>
-              <a:t>3/13/2016</a:t>
+              <a:t>3/16/2016</a:t>
             </a:fld>
             <a:endParaRPr lang="en-US"/>
           </a:p>
@@ -2720,7 +2720,7 @@
           <a:p>
             <a:fld id="{BE030ECD-E892-4916-8E25-18546EF25E3A}" type="datetimeFigureOut">
               <a:rPr lang="en-US" smtClean="0"/>
-              <a:t>3/13/2016</a:t>
+              <a:t>3/16/2016</a:t>
             </a:fld>
             <a:endParaRPr lang="en-US"/>
           </a:p>
@@ -3220,6 +3220,124 @@
           </a:p>
         </p:txBody>
       </p:sp>
+      <p:sp>
+        <p:nvSpPr>
+          <p:cNvPr id="2" name="TextBox 1"/>
+          <p:cNvSpPr txBox="1"/>
+          <p:nvPr/>
+        </p:nvSpPr>
+        <p:spPr>
+          <a:xfrm>
+            <a:off x="5715000" y="762000"/>
+            <a:ext cx="533400" cy="646331"/>
+          </a:xfrm>
+          <a:prstGeom prst="rect">
+            <a:avLst/>
+          </a:prstGeom>
+          <a:solidFill>
+            <a:schemeClr val="bg1"/>
+          </a:solidFill>
+        </p:spPr>
+        <p:txBody>
+          <a:bodyPr wrap="square" rtlCol="0">
+            <a:spAutoFit/>
+          </a:bodyPr>
+          <a:lstStyle/>
+          <a:p>
+            <a:r>
+              <a:rPr lang="en-US" sz="3600" b="1" dirty="0" smtClean="0"/>
+              <a:t>2l</a:t>
+            </a:r>
+            <a:endParaRPr lang="en-US" sz="3600" b="1" dirty="0"/>
+          </a:p>
+        </p:txBody>
+      </p:sp>
+      <mc:AlternateContent xmlns:mc="http://schemas.openxmlformats.org/markup-compatibility/2006">
+        <mc:Choice xmlns:a14="http://schemas.microsoft.com/office/drawing/2010/main" Requires="a14">
+          <p:sp>
+            <p:nvSpPr>
+              <p:cNvPr id="7" name="TextBox 6"/>
+              <p:cNvSpPr txBox="1"/>
+              <p:nvPr/>
+            </p:nvSpPr>
+            <p:spPr>
+              <a:xfrm>
+                <a:off x="3657600" y="2949714"/>
+                <a:ext cx="838200" cy="707886"/>
+              </a:xfrm>
+              <a:prstGeom prst="rect">
+                <a:avLst/>
+              </a:prstGeom>
+              <a:solidFill>
+                <a:schemeClr val="bg1"/>
+              </a:solidFill>
+            </p:spPr>
+            <p:txBody>
+              <a:bodyPr wrap="square" rtlCol="0">
+                <a:spAutoFit/>
+              </a:bodyPr>
+              <a:lstStyle/>
+              <a:p>
+                <a14:m>
+                  <m:oMathPara xmlns:m="http://schemas.openxmlformats.org/officeDocument/2006/math">
+                    <m:oMathParaPr>
+                      <m:jc m:val="centerGroup"/>
+                    </m:oMathParaPr>
+                    <m:oMath xmlns:m="http://schemas.openxmlformats.org/officeDocument/2006/math">
+                      <m:r>
+                        <a:rPr lang="en-US" sz="4000" i="1" smtClean="0">
+                          <a:latin typeface="Cambria Math"/>
+                          <a:ea typeface="Cambria Math"/>
+                        </a:rPr>
+                        <m:t>𝜎</m:t>
+                      </m:r>
+                    </m:oMath>
+                  </m:oMathPara>
+                </a14:m>
+                <a:endParaRPr lang="en-US" sz="4000" dirty="0"/>
+              </a:p>
+            </p:txBody>
+          </p:sp>
+        </mc:Choice>
+        <mc:Fallback>
+          <p:sp>
+            <p:nvSpPr>
+              <p:cNvPr id="7" name="TextBox 6"/>
+              <p:cNvSpPr txBox="1">
+                <a:spLocks noRot="1" noChangeAspect="1" noMove="1" noResize="1" noEditPoints="1" noAdjustHandles="1" noChangeArrowheads="1" noChangeShapeType="1" noTextEdit="1"/>
+              </p:cNvSpPr>
+              <p:nvPr/>
+            </p:nvSpPr>
+            <p:spPr>
+              <a:xfrm>
+                <a:off x="3657600" y="2949714"/>
+                <a:ext cx="838200" cy="707886"/>
+              </a:xfrm>
+              <a:prstGeom prst="rect">
+                <a:avLst/>
+              </a:prstGeom>
+              <a:blipFill rotWithShape="1">
+                <a:blip r:embed="rId3"/>
+                <a:stretch>
+                  <a:fillRect/>
+                </a:stretch>
+              </a:blipFill>
+            </p:spPr>
+            <p:txBody>
+              <a:bodyPr/>
+              <a:lstStyle/>
+              <a:p>
+                <a:r>
+                  <a:rPr lang="en-US">
+                    <a:noFill/>
+                  </a:rPr>
+                  <a:t> </a:t>
+                </a:r>
+              </a:p>
+            </p:txBody>
+          </p:sp>
+        </mc:Fallback>
+      </mc:AlternateContent>
     </p:spTree>
     <p:extLst>
       <p:ext uri="{BB962C8B-B14F-4D97-AF65-F5344CB8AC3E}">

</xml_diff>